<commit_message>
update the hackathon files
</commit_message>
<xml_diff>
--- a/Lessons/D_Regression_LogisticRegression_Rpart/C_Decision Trees.pptx
+++ b/Lessons/D_Regression_LogisticRegression_Rpart/C_Decision Trees.pptx
@@ -245,7 +245,7 @@
           <a:p>
             <a:fld id="{B0C0A60C-850A-4EA4-9C14-A8FE98B94505}" type="datetimeFigureOut">
               <a:rPr lang="en-US" smtClean="0"/>
-              <a:t>3/12/23</a:t>
+              <a:t>1/30/24</a:t>
             </a:fld>
             <a:endParaRPr lang="en-US"/>
           </a:p>
@@ -1139,7 +1139,7 @@
           <a:p>
             <a:fld id="{5738B90E-0779-4C36-915C-6F05FCD89456}" type="datetime1">
               <a:rPr lang="en-US" smtClean="0"/>
-              <a:t>3/12/23</a:t>
+              <a:t>1/30/24</a:t>
             </a:fld>
             <a:endParaRPr lang="en-US"/>
           </a:p>
@@ -1322,7 +1322,7 @@
           <a:p>
             <a:fld id="{7B9EA29D-D431-42FE-B7B6-AAE4454C77D3}" type="datetime1">
               <a:rPr lang="en-US" smtClean="0"/>
-              <a:t>3/12/23</a:t>
+              <a:t>1/30/24</a:t>
             </a:fld>
             <a:endParaRPr lang="en-US"/>
           </a:p>
@@ -1565,7 +1565,7 @@
           <a:p>
             <a:fld id="{690D8A1E-EA8F-46C1-B891-AE0C00D9C314}" type="datetime1">
               <a:rPr lang="en-US" smtClean="0"/>
-              <a:t>3/12/23</a:t>
+              <a:t>1/30/24</a:t>
             </a:fld>
             <a:endParaRPr lang="en-US"/>
           </a:p>
@@ -1824,7 +1824,7 @@
           <a:p>
             <a:fld id="{D753EFC8-4232-4598-94F6-94C0EBAFC469}" type="datetime1">
               <a:rPr lang="en-US" smtClean="0"/>
-              <a:t>3/12/23</a:t>
+              <a:t>1/30/24</a:t>
             </a:fld>
             <a:endParaRPr lang="en-US"/>
           </a:p>
@@ -2104,7 +2104,7 @@
           <a:p>
             <a:fld id="{F3161074-1C18-4AE7-957D-F18524378C85}" type="datetime1">
               <a:rPr lang="en-US" smtClean="0"/>
-              <a:t>3/12/23</a:t>
+              <a:t>1/30/24</a:t>
             </a:fld>
             <a:endParaRPr lang="en-US"/>
           </a:p>
@@ -2343,7 +2343,7 @@
           <a:p>
             <a:fld id="{69BE256C-8D9A-4404-B47D-41A1AE514425}" type="datetime1">
               <a:rPr lang="en-US" smtClean="0"/>
-              <a:t>3/12/23</a:t>
+              <a:t>1/30/24</a:t>
             </a:fld>
             <a:endParaRPr lang="en-US"/>
           </a:p>
@@ -2742,7 +2742,7 @@
           <a:p>
             <a:fld id="{66CB2154-9035-4012-8189-BAAB61C5A5EE}" type="datetime1">
               <a:rPr lang="en-US" smtClean="0"/>
-              <a:t>3/12/23</a:t>
+              <a:t>1/30/24</a:t>
             </a:fld>
             <a:endParaRPr lang="en-US"/>
           </a:p>
@@ -2899,7 +2899,7 @@
           <a:p>
             <a:fld id="{6700A58B-DD98-43D0-B791-721480A02982}" type="datetime1">
               <a:rPr lang="en-US" smtClean="0"/>
-              <a:t>3/12/23</a:t>
+              <a:t>1/30/24</a:t>
             </a:fld>
             <a:endParaRPr lang="en-US"/>
           </a:p>
@@ -3056,7 +3056,7 @@
           <a:p>
             <a:fld id="{7DB6E382-4F61-4E24-BE1A-377EC83D0E3A}" type="datetime1">
               <a:rPr lang="en-US" smtClean="0"/>
-              <a:t>3/12/23</a:t>
+              <a:t>1/30/24</a:t>
             </a:fld>
             <a:endParaRPr lang="en-US"/>
           </a:p>
@@ -3332,7 +3332,7 @@
           <a:p>
             <a:fld id="{4142EED6-FC16-45B9-B8C4-2BC5DBA88325}" type="datetime1">
               <a:rPr lang="en-US" smtClean="0"/>
-              <a:t>3/12/23</a:t>
+              <a:t>1/30/24</a:t>
             </a:fld>
             <a:endParaRPr lang="en-US"/>
           </a:p>
@@ -3615,7 +3615,7 @@
           <a:p>
             <a:fld id="{DF59512B-4F1D-43D7-8819-2F53FEF69650}" type="datetime1">
               <a:rPr lang="en-US" smtClean="0"/>
-              <a:t>3/12/23</a:t>
+              <a:t>1/30/24</a:t>
             </a:fld>
             <a:endParaRPr lang="en-US"/>
           </a:p>
@@ -3856,7 +3856,7 @@
           <a:p>
             <a:fld id="{08437B94-E2BF-44DC-ADC5-B05FC9934E9D}" type="datetime1">
               <a:rPr lang="en-US" smtClean="0"/>
-              <a:t>3/12/23</a:t>
+              <a:t>1/30/24</a:t>
             </a:fld>
             <a:endParaRPr lang="en-US"/>
           </a:p>
@@ -4376,7 +4376,7 @@
           <a:p>
             <a:fld id="{5738B90E-0779-4C36-915C-6F05FCD89456}" type="datetime1">
               <a:rPr lang="en-US" smtClean="0"/>
-              <a:t>3/12/23</a:t>
+              <a:t>1/30/24</a:t>
             </a:fld>
             <a:endParaRPr lang="en-US"/>
           </a:p>
@@ -4510,7 +4510,7 @@
           <a:p>
             <a:fld id="{6700A58B-DD98-43D0-B791-721480A02982}" type="datetime1">
               <a:rPr lang="en-US" smtClean="0"/>
-              <a:t>3/12/23</a:t>
+              <a:t>1/30/24</a:t>
             </a:fld>
             <a:endParaRPr lang="en-US"/>
           </a:p>
@@ -4882,7 +4882,7 @@
           <a:p>
             <a:fld id="{6700A58B-DD98-43D0-B791-721480A02982}" type="datetime1">
               <a:rPr lang="en-US" smtClean="0"/>
-              <a:t>3/12/23</a:t>
+              <a:t>1/30/24</a:t>
             </a:fld>
             <a:endParaRPr lang="en-US"/>
           </a:p>
@@ -5195,7 +5195,7 @@
           <a:p>
             <a:fld id="{6700A58B-DD98-43D0-B791-721480A02982}" type="datetime1">
               <a:rPr lang="en-US" smtClean="0"/>
-              <a:t>3/12/23</a:t>
+              <a:t>1/30/24</a:t>
             </a:fld>
             <a:endParaRPr lang="en-US"/>
           </a:p>
@@ -5508,7 +5508,7 @@
           <a:p>
             <a:fld id="{6700A58B-DD98-43D0-B791-721480A02982}" type="datetime1">
               <a:rPr lang="en-US" smtClean="0"/>
-              <a:t>3/12/23</a:t>
+              <a:t>1/30/24</a:t>
             </a:fld>
             <a:endParaRPr lang="en-US"/>
           </a:p>
@@ -5920,7 +5920,7 @@
 </file>
 
 <file path=ppt/slides/slide14.xml><?xml version="1.0" encoding="utf-8"?>
-<p:sld xmlns:a="http://schemas.openxmlformats.org/drawingml/2006/main" xmlns:r="http://schemas.openxmlformats.org/officeDocument/2006/relationships" xmlns:p="http://schemas.openxmlformats.org/presentationml/2006/main">
+<p:sld xmlns:a="http://schemas.openxmlformats.org/drawingml/2006/main" xmlns:r="http://schemas.openxmlformats.org/officeDocument/2006/relationships" xmlns:p="http://schemas.openxmlformats.org/presentationml/2006/main" show="0">
   <p:cSld>
     <p:spTree>
       <p:nvGrpSpPr>
@@ -5959,7 +5959,7 @@
           <a:p>
             <a:fld id="{7DB6E382-4F61-4E24-BE1A-377EC83D0E3A}" type="datetime1">
               <a:rPr lang="en-US" smtClean="0"/>
-              <a:t>3/12/23</a:t>
+              <a:t>1/30/24</a:t>
             </a:fld>
             <a:endParaRPr lang="en-US"/>
           </a:p>
@@ -6321,7 +6321,7 @@
           <a:p>
             <a:fld id="{6700A58B-DD98-43D0-B791-721480A02982}" type="datetime1">
               <a:rPr lang="en-US" smtClean="0"/>
-              <a:t>3/12/23</a:t>
+              <a:t>1/30/24</a:t>
             </a:fld>
             <a:endParaRPr lang="en-US"/>
           </a:p>
@@ -7133,7 +7133,7 @@
           <a:p>
             <a:fld id="{6700A58B-DD98-43D0-B791-721480A02982}" type="datetime1">
               <a:rPr lang="en-US" smtClean="0"/>
-              <a:t>3/12/23</a:t>
+              <a:t>1/30/24</a:t>
             </a:fld>
             <a:endParaRPr lang="en-US"/>
           </a:p>
@@ -8033,7 +8033,7 @@
 </file>
 
 <file path=ppt/slides/slide17.xml><?xml version="1.0" encoding="utf-8"?>
-<p:sld xmlns:a="http://schemas.openxmlformats.org/drawingml/2006/main" xmlns:r="http://schemas.openxmlformats.org/officeDocument/2006/relationships" xmlns:p="http://schemas.openxmlformats.org/presentationml/2006/main">
+<p:sld xmlns:a="http://schemas.openxmlformats.org/drawingml/2006/main" xmlns:r="http://schemas.openxmlformats.org/officeDocument/2006/relationships" xmlns:p="http://schemas.openxmlformats.org/presentationml/2006/main" show="0">
   <p:cSld>
     <p:spTree>
       <p:nvGrpSpPr>
@@ -8192,7 +8192,7 @@
           <a:p>
             <a:fld id="{6700A58B-DD98-43D0-B791-721480A02982}" type="datetime1">
               <a:rPr lang="en-US" smtClean="0"/>
-              <a:t>3/12/23</a:t>
+              <a:t>1/30/24</a:t>
             </a:fld>
             <a:endParaRPr lang="en-US"/>
           </a:p>
@@ -9644,7 +9644,7 @@
           <a:p>
             <a:fld id="{6700A58B-DD98-43D0-B791-721480A02982}" type="datetime1">
               <a:rPr lang="en-US" smtClean="0"/>
-              <a:t>3/12/23</a:t>
+              <a:t>1/30/24</a:t>
             </a:fld>
             <a:endParaRPr lang="en-US"/>
           </a:p>
@@ -10560,7 +10560,7 @@
           <a:p>
             <a:fld id="{6700A58B-DD98-43D0-B791-721480A02982}" type="datetime1">
               <a:rPr lang="en-US" smtClean="0"/>
-              <a:t>3/12/23</a:t>
+              <a:t>1/30/24</a:t>
             </a:fld>
             <a:endParaRPr lang="en-US"/>
           </a:p>
@@ -10899,7 +10899,7 @@
           <a:p>
             <a:fld id="{6700A58B-DD98-43D0-B791-721480A02982}" type="datetime1">
               <a:rPr lang="en-US" smtClean="0"/>
-              <a:t>3/12/23</a:t>
+              <a:t>1/30/24</a:t>
             </a:fld>
             <a:endParaRPr lang="en-US"/>
           </a:p>
@@ -11106,7 +11106,7 @@
             </a:pPr>
             <a:r>
               <a:rPr lang="en-US" sz="1200" dirty="0"/>
-              <a:t>Regression, Logistic Regression, KNN etc.</a:t>
+              <a:t>Regression, Logistic Regression, Decision Tree etc.</a:t>
             </a:r>
           </a:p>
           <a:p>
@@ -12034,7 +12034,7 @@
           <a:p>
             <a:fld id="{6700A58B-DD98-43D0-B791-721480A02982}" type="datetime1">
               <a:rPr lang="en-US" smtClean="0"/>
-              <a:t>3/12/23</a:t>
+              <a:t>1/30/24</a:t>
             </a:fld>
             <a:endParaRPr lang="en-US"/>
           </a:p>
@@ -12376,7 +12376,7 @@
           <a:p>
             <a:fld id="{6700A58B-DD98-43D0-B791-721480A02982}" type="datetime1">
               <a:rPr lang="en-US" smtClean="0"/>
-              <a:t>3/12/23</a:t>
+              <a:t>1/30/24</a:t>
             </a:fld>
             <a:endParaRPr lang="en-US"/>
           </a:p>
@@ -13679,7 +13679,7 @@
                 <a:tabLst/>
                 <a:defRPr/>
               </a:pPr>
-              <a:t>3/12/23</a:t>
+              <a:t>1/30/24</a:t>
             </a:fld>
             <a:endParaRPr kumimoji="0" lang="en-US" sz="900" b="0" i="0" u="none" strike="noStrike" kern="1200" cap="none" spc="0" normalizeH="0" baseline="0" noProof="0">
               <a:ln>
@@ -15155,7 +15155,7 @@
                 <a:tabLst/>
                 <a:defRPr/>
               </a:pPr>
-              <a:t>3/12/23</a:t>
+              <a:t>1/30/24</a:t>
             </a:fld>
             <a:endParaRPr kumimoji="0" lang="en-US" sz="900" b="0" i="0" u="none" strike="noStrike" kern="1200" cap="none" spc="0" normalizeH="0" baseline="0" noProof="0">
               <a:ln>
@@ -16693,7 +16693,7 @@
                 <a:tabLst/>
                 <a:defRPr/>
               </a:pPr>
-              <a:t>3/12/23</a:t>
+              <a:t>1/30/24</a:t>
             </a:fld>
             <a:endParaRPr kumimoji="0" lang="en-US" sz="900" b="0" i="0" u="none" strike="noStrike" kern="1200" cap="none" spc="0" normalizeH="0" baseline="0" noProof="0">
               <a:ln>
@@ -17332,7 +17332,7 @@
                 <a:tabLst/>
                 <a:defRPr/>
               </a:pPr>
-              <a:t>3/12/23</a:t>
+              <a:t>1/30/24</a:t>
             </a:fld>
             <a:endParaRPr kumimoji="0" lang="en-US" sz="900" b="0" i="0" u="none" strike="noStrike" kern="1200" cap="none" spc="0" normalizeH="0" baseline="0" noProof="0">
               <a:ln>
@@ -17875,7 +17875,7 @@
 </file>
 
 <file path=ppt/slides/slide26.xml><?xml version="1.0" encoding="utf-8"?>
-<p:sld xmlns:a="http://schemas.openxmlformats.org/drawingml/2006/main" xmlns:r="http://schemas.openxmlformats.org/officeDocument/2006/relationships" xmlns:p="http://schemas.openxmlformats.org/presentationml/2006/main">
+<p:sld xmlns:a="http://schemas.openxmlformats.org/drawingml/2006/main" xmlns:r="http://schemas.openxmlformats.org/officeDocument/2006/relationships" xmlns:p="http://schemas.openxmlformats.org/presentationml/2006/main" show="0">
   <p:cSld>
     <p:spTree>
       <p:nvGrpSpPr>
@@ -18016,7 +18016,7 @@
           <a:p>
             <a:fld id="{9B19E99B-5349-415A-8E56-8E989211A366}" type="datetime1">
               <a:rPr lang="en-US" smtClean="0"/>
-              <a:t>3/12/23</a:t>
+              <a:t>1/30/24</a:t>
             </a:fld>
             <a:endParaRPr lang="en-US"/>
           </a:p>
@@ -18178,7 +18178,7 @@
           <a:p>
             <a:fld id="{6700A58B-DD98-43D0-B791-721480A02982}" type="datetime1">
               <a:rPr lang="en-US" smtClean="0"/>
-              <a:t>3/12/23</a:t>
+              <a:t>1/30/24</a:t>
             </a:fld>
             <a:endParaRPr lang="en-US"/>
           </a:p>
@@ -18443,7 +18443,7 @@
           <a:p>
             <a:fld id="{6700A58B-DD98-43D0-B791-721480A02982}" type="datetime1">
               <a:rPr lang="en-US" smtClean="0"/>
-              <a:t>3/12/23</a:t>
+              <a:t>1/30/24</a:t>
             </a:fld>
             <a:endParaRPr lang="en-US"/>
           </a:p>
@@ -18779,7 +18779,7 @@
           <a:p>
             <a:fld id="{6700A58B-DD98-43D0-B791-721480A02982}" type="datetime1">
               <a:rPr lang="en-US" smtClean="0"/>
-              <a:t>3/12/23</a:t>
+              <a:t>1/30/24</a:t>
             </a:fld>
             <a:endParaRPr lang="en-US"/>
           </a:p>
@@ -19190,7 +19190,7 @@
 </file>
 
 <file path=ppt/slides/slide3.xml><?xml version="1.0" encoding="utf-8"?>
-<p:sld xmlns:a="http://schemas.openxmlformats.org/drawingml/2006/main" xmlns:r="http://schemas.openxmlformats.org/officeDocument/2006/relationships" xmlns:p="http://schemas.openxmlformats.org/presentationml/2006/main">
+<p:sld xmlns:a="http://schemas.openxmlformats.org/drawingml/2006/main" xmlns:r="http://schemas.openxmlformats.org/officeDocument/2006/relationships" xmlns:p="http://schemas.openxmlformats.org/presentationml/2006/main" show="0">
   <p:cSld>
     <p:spTree>
       <p:nvGrpSpPr>
@@ -19229,7 +19229,7 @@
           <a:p>
             <a:fld id="{6700A58B-DD98-43D0-B791-721480A02982}" type="datetime1">
               <a:rPr lang="en-US" smtClean="0"/>
-              <a:t>3/12/23</a:t>
+              <a:t>1/30/24</a:t>
             </a:fld>
             <a:endParaRPr lang="en-US"/>
           </a:p>
@@ -19515,7 +19515,7 @@
           <a:p>
             <a:fld id="{6700A58B-DD98-43D0-B791-721480A02982}" type="datetime1">
               <a:rPr lang="en-US" smtClean="0"/>
-              <a:t>3/12/23</a:t>
+              <a:t>1/30/24</a:t>
             </a:fld>
             <a:endParaRPr lang="en-US"/>
           </a:p>
@@ -20980,7 +20980,7 @@
           <a:p>
             <a:fld id="{6700A58B-DD98-43D0-B791-721480A02982}" type="datetime1">
               <a:rPr lang="en-US" smtClean="0"/>
-              <a:t>3/12/23</a:t>
+              <a:t>1/30/24</a:t>
             </a:fld>
             <a:endParaRPr lang="en-US"/>
           </a:p>
@@ -21398,7 +21398,7 @@
           <a:p>
             <a:fld id="{6700A58B-DD98-43D0-B791-721480A02982}" type="datetime1">
               <a:rPr lang="en-US" smtClean="0"/>
-              <a:t>3/12/23</a:t>
+              <a:t>1/30/24</a:t>
             </a:fld>
             <a:endParaRPr lang="en-US"/>
           </a:p>
@@ -22377,7 +22377,7 @@
           <a:p>
             <a:fld id="{6700A58B-DD98-43D0-B791-721480A02982}" type="datetime1">
               <a:rPr lang="en-US" smtClean="0"/>
-              <a:t>3/12/23</a:t>
+              <a:t>1/30/24</a:t>
             </a:fld>
             <a:endParaRPr lang="en-US"/>
           </a:p>
@@ -23429,7 +23429,7 @@
           <a:p>
             <a:fld id="{6700A58B-DD98-43D0-B791-721480A02982}" type="datetime1">
               <a:rPr lang="en-US" smtClean="0"/>
-              <a:t>3/12/23</a:t>
+              <a:t>1/30/24</a:t>
             </a:fld>
             <a:endParaRPr lang="en-US"/>
           </a:p>
@@ -23601,7 +23601,7 @@
           <a:p>
             <a:fld id="{6700A58B-DD98-43D0-B791-721480A02982}" type="datetime1">
               <a:rPr lang="en-US" smtClean="0"/>
-              <a:t>3/12/23</a:t>
+              <a:t>1/30/24</a:t>
             </a:fld>
             <a:endParaRPr lang="en-US"/>
           </a:p>
@@ -24233,7 +24233,7 @@
 </file>
 
 <file path=ppt/slides/slide4.xml><?xml version="1.0" encoding="utf-8"?>
-<p:sld xmlns:a="http://schemas.openxmlformats.org/drawingml/2006/main" xmlns:r="http://schemas.openxmlformats.org/officeDocument/2006/relationships" xmlns:p="http://schemas.openxmlformats.org/presentationml/2006/main">
+<p:sld xmlns:a="http://schemas.openxmlformats.org/drawingml/2006/main" xmlns:r="http://schemas.openxmlformats.org/officeDocument/2006/relationships" xmlns:p="http://schemas.openxmlformats.org/presentationml/2006/main" show="0">
   <p:cSld>
     <p:spTree>
       <p:nvGrpSpPr>
@@ -24355,7 +24355,7 @@
           <a:p>
             <a:fld id="{9B19E99B-5349-415A-8E56-8E989211A366}" type="datetime1">
               <a:rPr lang="en-US" smtClean="0"/>
-              <a:t>3/12/23</a:t>
+              <a:t>1/30/24</a:t>
             </a:fld>
             <a:endParaRPr lang="en-US"/>
           </a:p>
@@ -24487,7 +24487,7 @@
           <a:p>
             <a:fld id="{6700A58B-DD98-43D0-B791-721480A02982}" type="datetime1">
               <a:rPr lang="en-US" smtClean="0"/>
-              <a:t>3/12/23</a:t>
+              <a:t>1/30/24</a:t>
             </a:fld>
             <a:endParaRPr lang="en-US"/>
           </a:p>
@@ -24738,7 +24738,7 @@
           <a:p>
             <a:fld id="{6700A58B-DD98-43D0-B791-721480A02982}" type="datetime1">
               <a:rPr lang="en-US" smtClean="0"/>
-              <a:t>3/12/23</a:t>
+              <a:t>1/30/24</a:t>
             </a:fld>
             <a:endParaRPr lang="en-US"/>
           </a:p>
@@ -24930,7 +24930,7 @@
 </file>
 
 <file path=ppt/slides/slide7.xml><?xml version="1.0" encoding="utf-8"?>
-<p:sld xmlns:a="http://schemas.openxmlformats.org/drawingml/2006/main" xmlns:r="http://schemas.openxmlformats.org/officeDocument/2006/relationships" xmlns:p="http://schemas.openxmlformats.org/presentationml/2006/main">
+<p:sld xmlns:a="http://schemas.openxmlformats.org/drawingml/2006/main" xmlns:r="http://schemas.openxmlformats.org/officeDocument/2006/relationships" xmlns:p="http://schemas.openxmlformats.org/presentationml/2006/main" show="0">
   <p:cSld>
     <p:spTree>
       <p:nvGrpSpPr>
@@ -24969,7 +24969,7 @@
           <a:p>
             <a:fld id="{6700A58B-DD98-43D0-B791-721480A02982}" type="datetime1">
               <a:rPr lang="en-US" smtClean="0"/>
-              <a:t>3/12/23</a:t>
+              <a:t>1/30/24</a:t>
             </a:fld>
             <a:endParaRPr lang="en-US"/>
           </a:p>
@@ -25244,7 +25244,7 @@
 </file>
 
 <file path=ppt/slides/slide8.xml><?xml version="1.0" encoding="utf-8"?>
-<p:sld xmlns:a="http://schemas.openxmlformats.org/drawingml/2006/main" xmlns:r="http://schemas.openxmlformats.org/officeDocument/2006/relationships" xmlns:p="http://schemas.openxmlformats.org/presentationml/2006/main">
+<p:sld xmlns:a="http://schemas.openxmlformats.org/drawingml/2006/main" xmlns:r="http://schemas.openxmlformats.org/officeDocument/2006/relationships" xmlns:p="http://schemas.openxmlformats.org/presentationml/2006/main" show="0">
   <p:cSld>
     <p:spTree>
       <p:nvGrpSpPr>
@@ -25432,7 +25432,7 @@
           <a:p>
             <a:fld id="{9B19E99B-5349-415A-8E56-8E989211A366}" type="datetime1">
               <a:rPr lang="en-US" smtClean="0"/>
-              <a:t>3/12/23</a:t>
+              <a:t>1/30/24</a:t>
             </a:fld>
             <a:endParaRPr lang="en-US"/>
           </a:p>
@@ -25564,7 +25564,7 @@
           <a:p>
             <a:fld id="{6700A58B-DD98-43D0-B791-721480A02982}" type="datetime1">
               <a:rPr lang="en-US" smtClean="0"/>
-              <a:t>3/12/23</a:t>
+              <a:t>1/30/24</a:t>
             </a:fld>
             <a:endParaRPr lang="en-US"/>
           </a:p>

</xml_diff>